<commit_message>
feat: remove useless codes
</commit_message>
<xml_diff>
--- a/flowchart.pptx
+++ b/flowchart.pptx
@@ -105,6 +105,11 @@
       </a:defRPr>
     </a:lvl9pPr>
   </p:defaultTextStyle>
+  <p:extLst>
+    <p:ext uri="{EFAFB233-063F-42B5-8137-9DF3F51BA10A}">
+      <p15:sldGuideLst xmlns:p15="http://schemas.microsoft.com/office/powerpoint/2012/main"/>
+    </p:ext>
+  </p:extLst>
 </p:presentation>
 </file>
 
@@ -239,7 +244,7 @@
           <a:p>
             <a:fld id="{875CCAD8-3BF5-4540-A0C8-DA8711D9C39E}" type="datetimeFigureOut">
               <a:rPr lang="en-KR" smtClean="0"/>
-              <a:t>2022/05/31</a:t>
+              <a:t>2022/06/19</a:t>
             </a:fld>
             <a:endParaRPr lang="en-KR"/>
           </a:p>
@@ -409,7 +414,7 @@
           <a:p>
             <a:fld id="{875CCAD8-3BF5-4540-A0C8-DA8711D9C39E}" type="datetimeFigureOut">
               <a:rPr lang="en-KR" smtClean="0"/>
-              <a:t>2022/05/31</a:t>
+              <a:t>2022/06/19</a:t>
             </a:fld>
             <a:endParaRPr lang="en-KR"/>
           </a:p>
@@ -589,7 +594,7 @@
           <a:p>
             <a:fld id="{875CCAD8-3BF5-4540-A0C8-DA8711D9C39E}" type="datetimeFigureOut">
               <a:rPr lang="en-KR" smtClean="0"/>
-              <a:t>2022/05/31</a:t>
+              <a:t>2022/06/19</a:t>
             </a:fld>
             <a:endParaRPr lang="en-KR"/>
           </a:p>
@@ -759,7 +764,7 @@
           <a:p>
             <a:fld id="{875CCAD8-3BF5-4540-A0C8-DA8711D9C39E}" type="datetimeFigureOut">
               <a:rPr lang="en-KR" smtClean="0"/>
-              <a:t>2022/05/31</a:t>
+              <a:t>2022/06/19</a:t>
             </a:fld>
             <a:endParaRPr lang="en-KR"/>
           </a:p>
@@ -1003,7 +1008,7 @@
           <a:p>
             <a:fld id="{875CCAD8-3BF5-4540-A0C8-DA8711D9C39E}" type="datetimeFigureOut">
               <a:rPr lang="en-KR" smtClean="0"/>
-              <a:t>2022/05/31</a:t>
+              <a:t>2022/06/19</a:t>
             </a:fld>
             <a:endParaRPr lang="en-KR"/>
           </a:p>
@@ -1235,7 +1240,7 @@
           <a:p>
             <a:fld id="{875CCAD8-3BF5-4540-A0C8-DA8711D9C39E}" type="datetimeFigureOut">
               <a:rPr lang="en-KR" smtClean="0"/>
-              <a:t>2022/05/31</a:t>
+              <a:t>2022/06/19</a:t>
             </a:fld>
             <a:endParaRPr lang="en-KR"/>
           </a:p>
@@ -1602,7 +1607,7 @@
           <a:p>
             <a:fld id="{875CCAD8-3BF5-4540-A0C8-DA8711D9C39E}" type="datetimeFigureOut">
               <a:rPr lang="en-KR" smtClean="0"/>
-              <a:t>2022/05/31</a:t>
+              <a:t>2022/06/19</a:t>
             </a:fld>
             <a:endParaRPr lang="en-KR"/>
           </a:p>
@@ -1720,7 +1725,7 @@
           <a:p>
             <a:fld id="{875CCAD8-3BF5-4540-A0C8-DA8711D9C39E}" type="datetimeFigureOut">
               <a:rPr lang="en-KR" smtClean="0"/>
-              <a:t>2022/05/31</a:t>
+              <a:t>2022/06/19</a:t>
             </a:fld>
             <a:endParaRPr lang="en-KR"/>
           </a:p>
@@ -1815,7 +1820,7 @@
           <a:p>
             <a:fld id="{875CCAD8-3BF5-4540-A0C8-DA8711D9C39E}" type="datetimeFigureOut">
               <a:rPr lang="en-KR" smtClean="0"/>
-              <a:t>2022/05/31</a:t>
+              <a:t>2022/06/19</a:t>
             </a:fld>
             <a:endParaRPr lang="en-KR"/>
           </a:p>
@@ -2092,7 +2097,7 @@
           <a:p>
             <a:fld id="{875CCAD8-3BF5-4540-A0C8-DA8711D9C39E}" type="datetimeFigureOut">
               <a:rPr lang="en-KR" smtClean="0"/>
-              <a:t>2022/05/31</a:t>
+              <a:t>2022/06/19</a:t>
             </a:fld>
             <a:endParaRPr lang="en-KR"/>
           </a:p>
@@ -2349,7 +2354,7 @@
           <a:p>
             <a:fld id="{875CCAD8-3BF5-4540-A0C8-DA8711D9C39E}" type="datetimeFigureOut">
               <a:rPr lang="en-KR" smtClean="0"/>
-              <a:t>2022/05/31</a:t>
+              <a:t>2022/06/19</a:t>
             </a:fld>
             <a:endParaRPr lang="en-KR"/>
           </a:p>
@@ -2562,7 +2567,7 @@
           <a:p>
             <a:fld id="{875CCAD8-3BF5-4540-A0C8-DA8711D9C39E}" type="datetimeFigureOut">
               <a:rPr lang="en-KR" smtClean="0"/>
-              <a:t>2022/05/31</a:t>
+              <a:t>2022/06/19</a:t>
             </a:fld>
             <a:endParaRPr lang="en-KR"/>
           </a:p>
@@ -4228,7 +4233,7 @@
         <p:spPr>
           <a:xfrm>
             <a:off x="427383" y="506896"/>
-            <a:ext cx="5440400" cy="3139321"/>
+            <a:ext cx="646331" cy="369332"/>
           </a:xfrm>
           <a:prstGeom prst="rect">
             <a:avLst/>
@@ -4242,84 +4247,787 @@
           <a:lstStyle/>
           <a:p>
             <a:r>
-              <a:rPr lang="en-KR" dirty="0"/>
-              <a:t>object detection </a:t>
-            </a:r>
-          </a:p>
-          <a:p>
-            <a:r>
-              <a:rPr lang="en-KR" dirty="0"/>
-              <a:t>	jetson inference</a:t>
-            </a:r>
-          </a:p>
-          <a:p>
-            <a:r>
-              <a:rPr lang="en-KR" dirty="0"/>
-              <a:t>	torch2trt with light model</a:t>
-            </a:r>
-          </a:p>
-          <a:p>
-            <a:endParaRPr lang="en-KR" dirty="0"/>
-          </a:p>
-          <a:p>
-            <a:r>
-              <a:rPr lang="en-KR" dirty="0"/>
-              <a:t>lane detection</a:t>
-            </a:r>
-          </a:p>
-          <a:p>
-            <a:r>
-              <a:rPr lang="en-KR" dirty="0"/>
-              <a:t>	hough transform</a:t>
-            </a:r>
-          </a:p>
-          <a:p>
-            <a:r>
-              <a:rPr lang="en-KR" dirty="0"/>
-              <a:t>	github</a:t>
-            </a:r>
-            <a:r>
-              <a:rPr lang="ko-KR" altLang="en-US" dirty="0"/>
-              <a:t>에 </a:t>
-            </a:r>
-            <a:r>
-              <a:rPr lang="en-US" altLang="ko-KR" dirty="0"/>
-              <a:t>Lane Detection repo </a:t>
-            </a:r>
-            <a:r>
-              <a:rPr lang="ko-KR" altLang="en-US" dirty="0"/>
-              <a:t>많은데 이를 참고</a:t>
-            </a:r>
-            <a:endParaRPr lang="en-US" altLang="ko-KR" dirty="0"/>
-          </a:p>
-          <a:p>
-            <a:endParaRPr lang="en-US" dirty="0"/>
-          </a:p>
-          <a:p>
-            <a:r>
-              <a:rPr lang="en-US" dirty="0"/>
-              <a:t>Velocity prediction</a:t>
-            </a:r>
-          </a:p>
-          <a:p>
-            <a:r>
-              <a:rPr lang="en-US" dirty="0"/>
-              <a:t>	lane detection</a:t>
-            </a:r>
-            <a:r>
-              <a:rPr lang="ko-KR" altLang="en-US" dirty="0"/>
-              <a:t>시 차선을 하나하나 검출 </a:t>
-            </a:r>
-            <a:r>
-              <a:rPr lang="ko-KR" altLang="en-US" dirty="0" err="1"/>
-              <a:t>해야할듯</a:t>
-            </a:r>
-            <a:endParaRPr lang="en-US" altLang="ko-KR" dirty="0"/>
-          </a:p>
-          <a:p>
-            <a:r>
               <a:rPr lang="en-US" dirty="0"/>
               <a:t>	</a:t>
+            </a:r>
+            <a:endParaRPr lang="en-KR" dirty="0"/>
+          </a:p>
+        </p:txBody>
+      </p:sp>
+      <p:pic>
+        <p:nvPicPr>
+          <p:cNvPr id="12" name="Picture 11">
+            <a:extLst>
+              <a:ext uri="{FF2B5EF4-FFF2-40B4-BE49-F238E27FC236}">
+                <a16:creationId xmlns:a16="http://schemas.microsoft.com/office/drawing/2014/main" id="{95A7116E-1B52-11F1-8395-0AD1F487B1ED}"/>
+              </a:ext>
+            </a:extLst>
+          </p:cNvPr>
+          <p:cNvPicPr>
+            <a:picLocks noChangeAspect="1"/>
+          </p:cNvPicPr>
+          <p:nvPr/>
+        </p:nvPicPr>
+        <p:blipFill>
+          <a:blip r:embed="rId2"/>
+          <a:stretch>
+            <a:fillRect/>
+          </a:stretch>
+        </p:blipFill>
+        <p:spPr>
+          <a:xfrm>
+            <a:off x="0" y="0"/>
+            <a:ext cx="2029097" cy="930337"/>
+          </a:xfrm>
+          <a:prstGeom prst="rect">
+            <a:avLst/>
+          </a:prstGeom>
+        </p:spPr>
+      </p:pic>
+      <p:pic>
+        <p:nvPicPr>
+          <p:cNvPr id="13" name="Picture 12">
+            <a:extLst>
+              <a:ext uri="{FF2B5EF4-FFF2-40B4-BE49-F238E27FC236}">
+                <a16:creationId xmlns:a16="http://schemas.microsoft.com/office/drawing/2014/main" id="{D22D70D8-98D0-7E7E-76D2-F6A114ECA056}"/>
+              </a:ext>
+            </a:extLst>
+          </p:cNvPr>
+          <p:cNvPicPr>
+            <a:picLocks noChangeAspect="1"/>
+          </p:cNvPicPr>
+          <p:nvPr/>
+        </p:nvPicPr>
+        <p:blipFill>
+          <a:blip r:embed="rId3"/>
+          <a:stretch>
+            <a:fillRect/>
+          </a:stretch>
+        </p:blipFill>
+        <p:spPr>
+          <a:xfrm>
+            <a:off x="0" y="930337"/>
+            <a:ext cx="2029097" cy="905414"/>
+          </a:xfrm>
+          <a:prstGeom prst="rect">
+            <a:avLst/>
+          </a:prstGeom>
+        </p:spPr>
+      </p:pic>
+      <p:pic>
+        <p:nvPicPr>
+          <p:cNvPr id="14" name="Picture 13">
+            <a:extLst>
+              <a:ext uri="{FF2B5EF4-FFF2-40B4-BE49-F238E27FC236}">
+                <a16:creationId xmlns:a16="http://schemas.microsoft.com/office/drawing/2014/main" id="{0F79C632-099E-7199-DCA1-781BDDE1160B}"/>
+              </a:ext>
+            </a:extLst>
+          </p:cNvPr>
+          <p:cNvPicPr>
+            <a:picLocks noChangeAspect="1"/>
+          </p:cNvPicPr>
+          <p:nvPr/>
+        </p:nvPicPr>
+        <p:blipFill>
+          <a:blip r:embed="rId4"/>
+          <a:stretch>
+            <a:fillRect/>
+          </a:stretch>
+        </p:blipFill>
+        <p:spPr>
+          <a:xfrm>
+            <a:off x="-6350" y="1835395"/>
+            <a:ext cx="2029097" cy="875296"/>
+          </a:xfrm>
+          <a:prstGeom prst="rect">
+            <a:avLst/>
+          </a:prstGeom>
+        </p:spPr>
+      </p:pic>
+      <p:pic>
+        <p:nvPicPr>
+          <p:cNvPr id="15" name="Picture 14">
+            <a:extLst>
+              <a:ext uri="{FF2B5EF4-FFF2-40B4-BE49-F238E27FC236}">
+                <a16:creationId xmlns:a16="http://schemas.microsoft.com/office/drawing/2014/main" id="{6537156E-0483-AB56-A6F4-EB281393A5C9}"/>
+              </a:ext>
+            </a:extLst>
+          </p:cNvPr>
+          <p:cNvPicPr>
+            <a:picLocks noChangeAspect="1"/>
+          </p:cNvPicPr>
+          <p:nvPr/>
+        </p:nvPicPr>
+        <p:blipFill>
+          <a:blip r:embed="rId5"/>
+          <a:stretch>
+            <a:fillRect/>
+          </a:stretch>
+        </p:blipFill>
+        <p:spPr>
+          <a:xfrm>
+            <a:off x="-12700" y="2701290"/>
+            <a:ext cx="2041797" cy="858032"/>
+          </a:xfrm>
+          <a:prstGeom prst="rect">
+            <a:avLst/>
+          </a:prstGeom>
+        </p:spPr>
+      </p:pic>
+      <p:pic>
+        <p:nvPicPr>
+          <p:cNvPr id="16" name="Picture 15">
+            <a:extLst>
+              <a:ext uri="{FF2B5EF4-FFF2-40B4-BE49-F238E27FC236}">
+                <a16:creationId xmlns:a16="http://schemas.microsoft.com/office/drawing/2014/main" id="{E08606FD-C7B3-255A-E224-E5AD8F08E6A9}"/>
+              </a:ext>
+            </a:extLst>
+          </p:cNvPr>
+          <p:cNvPicPr>
+            <a:picLocks noChangeAspect="1"/>
+          </p:cNvPicPr>
+          <p:nvPr/>
+        </p:nvPicPr>
+        <p:blipFill>
+          <a:blip r:embed="rId6"/>
+          <a:stretch>
+            <a:fillRect/>
+          </a:stretch>
+        </p:blipFill>
+        <p:spPr>
+          <a:xfrm>
+            <a:off x="-12700" y="3559322"/>
+            <a:ext cx="2041797" cy="908359"/>
+          </a:xfrm>
+          <a:prstGeom prst="rect">
+            <a:avLst/>
+          </a:prstGeom>
+        </p:spPr>
+      </p:pic>
+      <p:pic>
+        <p:nvPicPr>
+          <p:cNvPr id="17" name="Picture 16">
+            <a:extLst>
+              <a:ext uri="{FF2B5EF4-FFF2-40B4-BE49-F238E27FC236}">
+                <a16:creationId xmlns:a16="http://schemas.microsoft.com/office/drawing/2014/main" id="{D808D7C4-5744-8B5E-3C06-3FEAD6E68ADD}"/>
+              </a:ext>
+            </a:extLst>
+          </p:cNvPr>
+          <p:cNvPicPr>
+            <a:picLocks noChangeAspect="1"/>
+          </p:cNvPicPr>
+          <p:nvPr/>
+        </p:nvPicPr>
+        <p:blipFill>
+          <a:blip r:embed="rId7"/>
+          <a:stretch>
+            <a:fillRect/>
+          </a:stretch>
+        </p:blipFill>
+        <p:spPr>
+          <a:xfrm>
+            <a:off x="-12700" y="4450050"/>
+            <a:ext cx="2041797" cy="886361"/>
+          </a:xfrm>
+          <a:prstGeom prst="rect">
+            <a:avLst/>
+          </a:prstGeom>
+        </p:spPr>
+      </p:pic>
+      <p:pic>
+        <p:nvPicPr>
+          <p:cNvPr id="18" name="Picture 17">
+            <a:extLst>
+              <a:ext uri="{FF2B5EF4-FFF2-40B4-BE49-F238E27FC236}">
+                <a16:creationId xmlns:a16="http://schemas.microsoft.com/office/drawing/2014/main" id="{679F2BC9-A3E7-2BA6-1855-E2414D3A8632}"/>
+              </a:ext>
+            </a:extLst>
+          </p:cNvPr>
+          <p:cNvPicPr>
+            <a:picLocks noChangeAspect="1"/>
+          </p:cNvPicPr>
+          <p:nvPr/>
+        </p:nvPicPr>
+        <p:blipFill>
+          <a:blip r:embed="rId8"/>
+          <a:stretch>
+            <a:fillRect/>
+          </a:stretch>
+        </p:blipFill>
+        <p:spPr>
+          <a:xfrm>
+            <a:off x="0" y="5336411"/>
+            <a:ext cx="2029097" cy="887730"/>
+          </a:xfrm>
+          <a:prstGeom prst="rect">
+            <a:avLst/>
+          </a:prstGeom>
+        </p:spPr>
+      </p:pic>
+      <p:pic>
+        <p:nvPicPr>
+          <p:cNvPr id="19" name="Picture 18">
+            <a:extLst>
+              <a:ext uri="{FF2B5EF4-FFF2-40B4-BE49-F238E27FC236}">
+                <a16:creationId xmlns:a16="http://schemas.microsoft.com/office/drawing/2014/main" id="{CF78D77D-9B40-592D-6157-80FA9FF858DC}"/>
+              </a:ext>
+            </a:extLst>
+          </p:cNvPr>
+          <p:cNvPicPr>
+            <a:picLocks noChangeAspect="1"/>
+          </p:cNvPicPr>
+          <p:nvPr/>
+        </p:nvPicPr>
+        <p:blipFill>
+          <a:blip r:embed="rId9"/>
+          <a:stretch>
+            <a:fillRect/>
+          </a:stretch>
+        </p:blipFill>
+        <p:spPr>
+          <a:xfrm>
+            <a:off x="-13456" y="6224141"/>
+            <a:ext cx="2042554" cy="909575"/>
+          </a:xfrm>
+          <a:prstGeom prst="rect">
+            <a:avLst/>
+          </a:prstGeom>
+        </p:spPr>
+      </p:pic>
+      <p:pic>
+        <p:nvPicPr>
+          <p:cNvPr id="21" name="Picture 20">
+            <a:extLst>
+              <a:ext uri="{FF2B5EF4-FFF2-40B4-BE49-F238E27FC236}">
+                <a16:creationId xmlns:a16="http://schemas.microsoft.com/office/drawing/2014/main" id="{BAF569C0-B766-B79F-3F53-B39079EF9AC0}"/>
+              </a:ext>
+            </a:extLst>
+          </p:cNvPr>
+          <p:cNvPicPr>
+            <a:picLocks noChangeAspect="1"/>
+          </p:cNvPicPr>
+          <p:nvPr/>
+        </p:nvPicPr>
+        <p:blipFill>
+          <a:blip r:embed="rId10"/>
+          <a:stretch>
+            <a:fillRect/>
+          </a:stretch>
+        </p:blipFill>
+        <p:spPr>
+          <a:xfrm>
+            <a:off x="0" y="7129555"/>
+            <a:ext cx="2041797" cy="864761"/>
+          </a:xfrm>
+          <a:prstGeom prst="rect">
+            <a:avLst/>
+          </a:prstGeom>
+        </p:spPr>
+      </p:pic>
+      <p:pic>
+        <p:nvPicPr>
+          <p:cNvPr id="22" name="Picture 21">
+            <a:extLst>
+              <a:ext uri="{FF2B5EF4-FFF2-40B4-BE49-F238E27FC236}">
+                <a16:creationId xmlns:a16="http://schemas.microsoft.com/office/drawing/2014/main" id="{9B1A4994-68CB-10F5-7556-E812321958A7}"/>
+              </a:ext>
+            </a:extLst>
+          </p:cNvPr>
+          <p:cNvPicPr>
+            <a:picLocks noChangeAspect="1"/>
+          </p:cNvPicPr>
+          <p:nvPr/>
+        </p:nvPicPr>
+        <p:blipFill>
+          <a:blip r:embed="rId11"/>
+          <a:stretch>
+            <a:fillRect/>
+          </a:stretch>
+        </p:blipFill>
+        <p:spPr>
+          <a:xfrm>
+            <a:off x="0" y="7980601"/>
+            <a:ext cx="2041797" cy="901262"/>
+          </a:xfrm>
+          <a:prstGeom prst="rect">
+            <a:avLst/>
+          </a:prstGeom>
+        </p:spPr>
+      </p:pic>
+      <p:sp>
+        <p:nvSpPr>
+          <p:cNvPr id="24" name="TextBox 23">
+            <a:extLst>
+              <a:ext uri="{FF2B5EF4-FFF2-40B4-BE49-F238E27FC236}">
+                <a16:creationId xmlns:a16="http://schemas.microsoft.com/office/drawing/2014/main" id="{46233BE4-B6C0-AFAE-0190-F53F45074F41}"/>
+              </a:ext>
+            </a:extLst>
+          </p:cNvPr>
+          <p:cNvSpPr txBox="1"/>
+          <p:nvPr/>
+        </p:nvSpPr>
+        <p:spPr>
+          <a:xfrm>
+            <a:off x="2542903" y="383177"/>
+            <a:ext cx="700833" cy="369332"/>
+          </a:xfrm>
+          <a:prstGeom prst="rect">
+            <a:avLst/>
+          </a:prstGeom>
+          <a:noFill/>
+        </p:spPr>
+        <p:txBody>
+          <a:bodyPr wrap="none" rtlCol="0">
+            <a:spAutoFit/>
+          </a:bodyPr>
+          <a:lstStyle/>
+          <a:p>
+            <a:r>
+              <a:rPr lang="en-KR" dirty="0"/>
+              <a:t>line X</a:t>
+            </a:r>
+          </a:p>
+        </p:txBody>
+      </p:sp>
+      <p:sp>
+        <p:nvSpPr>
+          <p:cNvPr id="25" name="TextBox 24">
+            <a:extLst>
+              <a:ext uri="{FF2B5EF4-FFF2-40B4-BE49-F238E27FC236}">
+                <a16:creationId xmlns:a16="http://schemas.microsoft.com/office/drawing/2014/main" id="{D6247AC4-E1C5-9269-2778-609AA4057497}"/>
+              </a:ext>
+            </a:extLst>
+          </p:cNvPr>
+          <p:cNvSpPr txBox="1"/>
+          <p:nvPr/>
+        </p:nvSpPr>
+        <p:spPr>
+          <a:xfrm>
+            <a:off x="2542902" y="1198378"/>
+            <a:ext cx="732893" cy="369332"/>
+          </a:xfrm>
+          <a:prstGeom prst="rect">
+            <a:avLst/>
+          </a:prstGeom>
+          <a:noFill/>
+        </p:spPr>
+        <p:txBody>
+          <a:bodyPr wrap="none" rtlCol="0">
+            <a:spAutoFit/>
+          </a:bodyPr>
+          <a:lstStyle/>
+          <a:p>
+            <a:r>
+              <a:rPr lang="en-KR" dirty="0"/>
+              <a:t>line O</a:t>
+            </a:r>
+          </a:p>
+        </p:txBody>
+      </p:sp>
+      <p:sp>
+        <p:nvSpPr>
+          <p:cNvPr id="26" name="TextBox 25">
+            <a:extLst>
+              <a:ext uri="{FF2B5EF4-FFF2-40B4-BE49-F238E27FC236}">
+                <a16:creationId xmlns:a16="http://schemas.microsoft.com/office/drawing/2014/main" id="{1DC0326D-1F05-A9B0-6FC3-76C41E534CFB}"/>
+              </a:ext>
+            </a:extLst>
+          </p:cNvPr>
+          <p:cNvSpPr txBox="1"/>
+          <p:nvPr/>
+        </p:nvSpPr>
+        <p:spPr>
+          <a:xfrm>
+            <a:off x="2526872" y="2088377"/>
+            <a:ext cx="732893" cy="369332"/>
+          </a:xfrm>
+          <a:prstGeom prst="rect">
+            <a:avLst/>
+          </a:prstGeom>
+          <a:noFill/>
+        </p:spPr>
+        <p:txBody>
+          <a:bodyPr wrap="none" rtlCol="0">
+            <a:spAutoFit/>
+          </a:bodyPr>
+          <a:lstStyle/>
+          <a:p>
+            <a:r>
+              <a:rPr lang="en-KR" dirty="0"/>
+              <a:t>line O</a:t>
+            </a:r>
+          </a:p>
+        </p:txBody>
+      </p:sp>
+      <p:sp>
+        <p:nvSpPr>
+          <p:cNvPr id="27" name="TextBox 26">
+            <a:extLst>
+              <a:ext uri="{FF2B5EF4-FFF2-40B4-BE49-F238E27FC236}">
+                <a16:creationId xmlns:a16="http://schemas.microsoft.com/office/drawing/2014/main" id="{11ED7BEF-DAEA-188B-9AA6-1DC2AF9027FC}"/>
+              </a:ext>
+            </a:extLst>
+          </p:cNvPr>
+          <p:cNvSpPr txBox="1"/>
+          <p:nvPr/>
+        </p:nvSpPr>
+        <p:spPr>
+          <a:xfrm>
+            <a:off x="2526872" y="2945640"/>
+            <a:ext cx="732893" cy="369332"/>
+          </a:xfrm>
+          <a:prstGeom prst="rect">
+            <a:avLst/>
+          </a:prstGeom>
+          <a:noFill/>
+        </p:spPr>
+        <p:txBody>
+          <a:bodyPr wrap="none" rtlCol="0">
+            <a:spAutoFit/>
+          </a:bodyPr>
+          <a:lstStyle/>
+          <a:p>
+            <a:r>
+              <a:rPr lang="en-KR" dirty="0"/>
+              <a:t>line O</a:t>
+            </a:r>
+          </a:p>
+        </p:txBody>
+      </p:sp>
+      <p:sp>
+        <p:nvSpPr>
+          <p:cNvPr id="28" name="TextBox 27">
+            <a:extLst>
+              <a:ext uri="{FF2B5EF4-FFF2-40B4-BE49-F238E27FC236}">
+                <a16:creationId xmlns:a16="http://schemas.microsoft.com/office/drawing/2014/main" id="{5E6E7029-88B3-7150-10D9-44F0023DC8DA}"/>
+              </a:ext>
+            </a:extLst>
+          </p:cNvPr>
+          <p:cNvSpPr txBox="1"/>
+          <p:nvPr/>
+        </p:nvSpPr>
+        <p:spPr>
+          <a:xfrm>
+            <a:off x="2510843" y="3828835"/>
+            <a:ext cx="732893" cy="369332"/>
+          </a:xfrm>
+          <a:prstGeom prst="rect">
+            <a:avLst/>
+          </a:prstGeom>
+          <a:noFill/>
+        </p:spPr>
+        <p:txBody>
+          <a:bodyPr wrap="none" rtlCol="0">
+            <a:spAutoFit/>
+          </a:bodyPr>
+          <a:lstStyle/>
+          <a:p>
+            <a:r>
+              <a:rPr lang="en-KR" dirty="0"/>
+              <a:t>line O</a:t>
+            </a:r>
+          </a:p>
+        </p:txBody>
+      </p:sp>
+      <p:sp>
+        <p:nvSpPr>
+          <p:cNvPr id="29" name="TextBox 28">
+            <a:extLst>
+              <a:ext uri="{FF2B5EF4-FFF2-40B4-BE49-F238E27FC236}">
+                <a16:creationId xmlns:a16="http://schemas.microsoft.com/office/drawing/2014/main" id="{A4C079C0-F0A0-5D70-02DF-9C69E606E8BB}"/>
+              </a:ext>
+            </a:extLst>
+          </p:cNvPr>
+          <p:cNvSpPr txBox="1"/>
+          <p:nvPr/>
+        </p:nvSpPr>
+        <p:spPr>
+          <a:xfrm>
+            <a:off x="2526872" y="4768334"/>
+            <a:ext cx="732893" cy="369332"/>
+          </a:xfrm>
+          <a:prstGeom prst="rect">
+            <a:avLst/>
+          </a:prstGeom>
+          <a:noFill/>
+        </p:spPr>
+        <p:txBody>
+          <a:bodyPr wrap="none" rtlCol="0">
+            <a:spAutoFit/>
+          </a:bodyPr>
+          <a:lstStyle/>
+          <a:p>
+            <a:r>
+              <a:rPr lang="en-KR" dirty="0"/>
+              <a:t>line O</a:t>
+            </a:r>
+          </a:p>
+        </p:txBody>
+      </p:sp>
+      <p:sp>
+        <p:nvSpPr>
+          <p:cNvPr id="30" name="TextBox 29">
+            <a:extLst>
+              <a:ext uri="{FF2B5EF4-FFF2-40B4-BE49-F238E27FC236}">
+                <a16:creationId xmlns:a16="http://schemas.microsoft.com/office/drawing/2014/main" id="{52295D6F-9BBC-ABFF-888E-1D81BFBEA4EB}"/>
+              </a:ext>
+            </a:extLst>
+          </p:cNvPr>
+          <p:cNvSpPr txBox="1"/>
+          <p:nvPr/>
+        </p:nvSpPr>
+        <p:spPr>
+          <a:xfrm>
+            <a:off x="2542901" y="5595610"/>
+            <a:ext cx="732893" cy="369332"/>
+          </a:xfrm>
+          <a:prstGeom prst="rect">
+            <a:avLst/>
+          </a:prstGeom>
+          <a:noFill/>
+        </p:spPr>
+        <p:txBody>
+          <a:bodyPr wrap="none" rtlCol="0">
+            <a:spAutoFit/>
+          </a:bodyPr>
+          <a:lstStyle/>
+          <a:p>
+            <a:r>
+              <a:rPr lang="en-KR" dirty="0"/>
+              <a:t>line O</a:t>
+            </a:r>
+          </a:p>
+        </p:txBody>
+      </p:sp>
+      <p:sp>
+        <p:nvSpPr>
+          <p:cNvPr id="31" name="TextBox 30">
+            <a:extLst>
+              <a:ext uri="{FF2B5EF4-FFF2-40B4-BE49-F238E27FC236}">
+                <a16:creationId xmlns:a16="http://schemas.microsoft.com/office/drawing/2014/main" id="{1C0D4692-F0A0-4742-B895-3F2622CA4E36}"/>
+              </a:ext>
+            </a:extLst>
+          </p:cNvPr>
+          <p:cNvSpPr txBox="1"/>
+          <p:nvPr/>
+        </p:nvSpPr>
+        <p:spPr>
+          <a:xfrm>
+            <a:off x="2542901" y="6494262"/>
+            <a:ext cx="732893" cy="369332"/>
+          </a:xfrm>
+          <a:prstGeom prst="rect">
+            <a:avLst/>
+          </a:prstGeom>
+          <a:noFill/>
+        </p:spPr>
+        <p:txBody>
+          <a:bodyPr wrap="none" rtlCol="0">
+            <a:spAutoFit/>
+          </a:bodyPr>
+          <a:lstStyle/>
+          <a:p>
+            <a:r>
+              <a:rPr lang="en-KR" dirty="0"/>
+              <a:t>line O</a:t>
+            </a:r>
+          </a:p>
+        </p:txBody>
+      </p:sp>
+      <p:sp>
+        <p:nvSpPr>
+          <p:cNvPr id="32" name="TextBox 31">
+            <a:extLst>
+              <a:ext uri="{FF2B5EF4-FFF2-40B4-BE49-F238E27FC236}">
+                <a16:creationId xmlns:a16="http://schemas.microsoft.com/office/drawing/2014/main" id="{F227B9FD-900D-7786-F212-531B748AC9E3}"/>
+              </a:ext>
+            </a:extLst>
+          </p:cNvPr>
+          <p:cNvSpPr txBox="1"/>
+          <p:nvPr/>
+        </p:nvSpPr>
+        <p:spPr>
+          <a:xfrm>
+            <a:off x="2542900" y="7377269"/>
+            <a:ext cx="732893" cy="369332"/>
+          </a:xfrm>
+          <a:prstGeom prst="rect">
+            <a:avLst/>
+          </a:prstGeom>
+          <a:noFill/>
+        </p:spPr>
+        <p:txBody>
+          <a:bodyPr wrap="none" rtlCol="0">
+            <a:spAutoFit/>
+          </a:bodyPr>
+          <a:lstStyle/>
+          <a:p>
+            <a:r>
+              <a:rPr lang="en-KR" dirty="0"/>
+              <a:t>line O</a:t>
+            </a:r>
+          </a:p>
+        </p:txBody>
+      </p:sp>
+      <p:sp>
+        <p:nvSpPr>
+          <p:cNvPr id="33" name="TextBox 32">
+            <a:extLst>
+              <a:ext uri="{FF2B5EF4-FFF2-40B4-BE49-F238E27FC236}">
+                <a16:creationId xmlns:a16="http://schemas.microsoft.com/office/drawing/2014/main" id="{05657477-D63F-A235-FD03-92B0DF68626E}"/>
+              </a:ext>
+            </a:extLst>
+          </p:cNvPr>
+          <p:cNvSpPr txBox="1"/>
+          <p:nvPr/>
+        </p:nvSpPr>
+        <p:spPr>
+          <a:xfrm>
+            <a:off x="2542899" y="8248414"/>
+            <a:ext cx="700833" cy="369332"/>
+          </a:xfrm>
+          <a:prstGeom prst="rect">
+            <a:avLst/>
+          </a:prstGeom>
+          <a:noFill/>
+        </p:spPr>
+        <p:txBody>
+          <a:bodyPr wrap="none" rtlCol="0">
+            <a:spAutoFit/>
+          </a:bodyPr>
+          <a:lstStyle/>
+          <a:p>
+            <a:r>
+              <a:rPr lang="en-KR" dirty="0"/>
+              <a:t>line X</a:t>
+            </a:r>
+          </a:p>
+        </p:txBody>
+      </p:sp>
+      <p:sp>
+        <p:nvSpPr>
+          <p:cNvPr id="39" name="Freeform 38">
+            <a:extLst>
+              <a:ext uri="{FF2B5EF4-FFF2-40B4-BE49-F238E27FC236}">
+                <a16:creationId xmlns:a16="http://schemas.microsoft.com/office/drawing/2014/main" id="{A5F0F921-5DF2-63E2-7E5B-9DAF41701A37}"/>
+              </a:ext>
+            </a:extLst>
+          </p:cNvPr>
+          <p:cNvSpPr/>
+          <p:nvPr/>
+        </p:nvSpPr>
+        <p:spPr>
+          <a:xfrm>
+            <a:off x="3474720" y="1393371"/>
+            <a:ext cx="993259" cy="6235338"/>
+          </a:xfrm>
+          <a:custGeom>
+            <a:avLst/>
+            <a:gdLst>
+              <a:gd name="connsiteX0" fmla="*/ 0 w 993259"/>
+              <a:gd name="connsiteY0" fmla="*/ 0 h 6235338"/>
+              <a:gd name="connsiteX1" fmla="*/ 992777 w 993259"/>
+              <a:gd name="connsiteY1" fmla="*/ 3666309 h 6235338"/>
+              <a:gd name="connsiteX2" fmla="*/ 139337 w 993259"/>
+              <a:gd name="connsiteY2" fmla="*/ 6235338 h 6235338"/>
+            </a:gdLst>
+            <a:ahLst/>
+            <a:cxnLst>
+              <a:cxn ang="0">
+                <a:pos x="connsiteX0" y="connsiteY0"/>
+              </a:cxn>
+              <a:cxn ang="0">
+                <a:pos x="connsiteX1" y="connsiteY1"/>
+              </a:cxn>
+              <a:cxn ang="0">
+                <a:pos x="connsiteX2" y="connsiteY2"/>
+              </a:cxn>
+            </a:cxnLst>
+            <a:rect l="l" t="t" r="r" b="b"/>
+            <a:pathLst>
+              <a:path w="993259" h="6235338">
+                <a:moveTo>
+                  <a:pt x="0" y="0"/>
+                </a:moveTo>
+                <a:cubicBezTo>
+                  <a:pt x="484777" y="1313543"/>
+                  <a:pt x="969554" y="2627086"/>
+                  <a:pt x="992777" y="3666309"/>
+                </a:cubicBezTo>
+                <a:cubicBezTo>
+                  <a:pt x="1016000" y="4705532"/>
+                  <a:pt x="193040" y="5849258"/>
+                  <a:pt x="139337" y="6235338"/>
+                </a:cubicBezTo>
+              </a:path>
+            </a:pathLst>
+          </a:custGeom>
+          <a:noFill/>
+        </p:spPr>
+        <p:style>
+          <a:lnRef idx="2">
+            <a:schemeClr val="accent1">
+              <a:shade val="50000"/>
+            </a:schemeClr>
+          </a:lnRef>
+          <a:fillRef idx="1">
+            <a:schemeClr val="accent1"/>
+          </a:fillRef>
+          <a:effectRef idx="0">
+            <a:schemeClr val="accent1"/>
+          </a:effectRef>
+          <a:fontRef idx="minor">
+            <a:schemeClr val="lt1"/>
+          </a:fontRef>
+        </p:style>
+        <p:txBody>
+          <a:bodyPr rtlCol="0" anchor="ctr"/>
+          <a:lstStyle/>
+          <a:p>
+            <a:pPr algn="ctr"/>
+            <a:endParaRPr lang="en-KR"/>
+          </a:p>
+        </p:txBody>
+      </p:sp>
+      <p:sp>
+        <p:nvSpPr>
+          <p:cNvPr id="40" name="TextBox 39">
+            <a:extLst>
+              <a:ext uri="{FF2B5EF4-FFF2-40B4-BE49-F238E27FC236}">
+                <a16:creationId xmlns:a16="http://schemas.microsoft.com/office/drawing/2014/main" id="{03E789A9-F672-8AE5-0C4E-974EFD30D5AB}"/>
+              </a:ext>
+            </a:extLst>
+          </p:cNvPr>
+          <p:cNvSpPr txBox="1"/>
+          <p:nvPr/>
+        </p:nvSpPr>
+        <p:spPr>
+          <a:xfrm>
+            <a:off x="4868091" y="4850674"/>
+            <a:ext cx="910890" cy="369332"/>
+          </a:xfrm>
+          <a:prstGeom prst="rect">
+            <a:avLst/>
+          </a:prstGeom>
+          <a:noFill/>
+        </p:spPr>
+        <p:txBody>
+          <a:bodyPr wrap="none" rtlCol="0">
+            <a:spAutoFit/>
+          </a:bodyPr>
+          <a:lstStyle/>
+          <a:p>
+            <a:r>
+              <a:rPr lang="en-US" altLang="ko-KR" dirty="0"/>
+              <a:t>8</a:t>
+            </a:r>
+            <a:r>
+              <a:rPr lang="ko-KR" altLang="en-US" dirty="0"/>
+              <a:t> </a:t>
+            </a:r>
+            <a:r>
+              <a:rPr lang="en-US" altLang="ko-KR" dirty="0"/>
+              <a:t>frame</a:t>
             </a:r>
             <a:endParaRPr lang="en-KR" dirty="0"/>
           </a:p>

</xml_diff>